<commit_message>
Fix link in command set customizer slide deck
</commit_message>
<xml_diff>
--- a/03 commandset.pptx
+++ b/03 commandset.pptx
@@ -274,7 +274,7 @@
               <a:rPr lang="en-US" smtClean="0">
                 <a:latin typeface="Segoe UI" pitchFamily="34" charset="0"/>
               </a:rPr>
-              <a:t>1/7/19 3:26 PM</a:t>
+              <a:t>3/3/2019 9:45 AM</a:t>
             </a:fld>
             <a:endParaRPr lang="en-US" dirty="0">
               <a:latin typeface="Segoe UI" pitchFamily="34" charset="0"/>
@@ -571,7 +571,7 @@
           <a:p>
             <a:fld id="{D18B56EA-E28F-4F92-9F16-7A6F2501B303}" type="datetime8">
               <a:rPr lang="en-US" smtClean="0"/>
-              <a:t>1/7/19 3:24 PM</a:t>
+              <a:t>3/3/2019 9:45 AM</a:t>
             </a:fld>
             <a:endParaRPr lang="en-US" dirty="0"/>
           </a:p>
@@ -954,7 +954,7 @@
           <a:p>
             <a:fld id="{D18B56EA-E28F-4F92-9F16-7A6F2501B303}" type="datetime8">
               <a:rPr lang="en-US" smtClean="0"/>
-              <a:t>1/7/19 3:24 PM</a:t>
+              <a:t>3/3/2019 9:45 AM</a:t>
             </a:fld>
             <a:endParaRPr lang="en-US" dirty="0"/>
           </a:p>
@@ -1135,7 +1135,7 @@
           <a:p>
             <a:fld id="{D18B56EA-E28F-4F92-9F16-7A6F2501B303}" type="datetime8">
               <a:rPr lang="en-US" smtClean="0"/>
-              <a:t>1/7/19 3:24 PM</a:t>
+              <a:t>3/3/2019 9:45 AM</a:t>
             </a:fld>
             <a:endParaRPr lang="en-US" dirty="0"/>
           </a:p>
@@ -1320,7 +1320,7 @@
           <a:p>
             <a:fld id="{D18B56EA-E28F-4F92-9F16-7A6F2501B303}" type="datetime8">
               <a:rPr lang="en-US" smtClean="0"/>
-              <a:t>1/7/19 3:29 PM</a:t>
+              <a:t>3/3/2019 9:45 AM</a:t>
             </a:fld>
             <a:endParaRPr lang="en-US" dirty="0"/>
           </a:p>
@@ -1501,7 +1501,7 @@
           <a:p>
             <a:fld id="{D18B56EA-E28F-4F92-9F16-7A6F2501B303}" type="datetime8">
               <a:rPr lang="en-US" smtClean="0"/>
-              <a:t>1/7/19 3:26 PM</a:t>
+              <a:t>3/3/2019 9:45 AM</a:t>
             </a:fld>
             <a:endParaRPr lang="en-US" dirty="0"/>
           </a:p>
@@ -1682,7 +1682,7 @@
           <a:p>
             <a:fld id="{D18B56EA-E28F-4F92-9F16-7A6F2501B303}" type="datetime8">
               <a:rPr lang="en-US" smtClean="0"/>
-              <a:t>1/7/19 3:26 PM</a:t>
+              <a:t>3/3/2019 9:45 AM</a:t>
             </a:fld>
             <a:endParaRPr lang="en-US" dirty="0"/>
           </a:p>
@@ -1863,7 +1863,7 @@
           <a:p>
             <a:fld id="{D18B56EA-E28F-4F92-9F16-7A6F2501B303}" type="datetime8">
               <a:rPr lang="en-US" smtClean="0"/>
-              <a:t>1/7/19 3:26 PM</a:t>
+              <a:t>3/3/2019 9:45 AM</a:t>
             </a:fld>
             <a:endParaRPr lang="en-US" dirty="0"/>
           </a:p>
@@ -2044,7 +2044,7 @@
           <a:p>
             <a:fld id="{D18B56EA-E28F-4F92-9F16-7A6F2501B303}" type="datetime8">
               <a:rPr lang="en-US" smtClean="0"/>
-              <a:t>1/7/19 3:26 PM</a:t>
+              <a:t>3/3/2019 9:45 AM</a:t>
             </a:fld>
             <a:endParaRPr lang="en-US" dirty="0"/>
           </a:p>
@@ -15553,7 +15553,7 @@
               <a:rPr lang="en-US" sz="1800" dirty="0">
                 <a:latin typeface="+mj-lt"/>
               </a:rPr>
-              <a:t>SharePoint Framework</a:t>
+              <a:t>Overview of the SharePoint Framework</a:t>
             </a:r>
           </a:p>
           <a:p>
@@ -15572,7 +15572,7 @@
                 <a:latin typeface="+mj-lt"/>
                 <a:hlinkClick r:id="rId3"/>
               </a:rPr>
-              <a:t>https://docs.microsoft.com/sharepoint/dev/spfx</a:t>
+              <a:t>https://docs.microsoft.com/sharepoint/dev/spfx/sharepoint-framework-overview</a:t>
             </a:r>
             <a:endParaRPr lang="en-US" sz="1800" dirty="0">
               <a:latin typeface="+mj-lt"/>

</xml_diff>